<commit_message>
updated feiertage.csv feiertage.R and presentation
</commit_message>
<xml_diff>
--- a/4_Presentation/Präsentation.pptx
+++ b/4_Presentation/Präsentation.pptx
@@ -255,7 +255,7 @@
             <a:pPr rtl="0"/>
             <a:fld id="{A271CF6F-B353-47EF-80E6-4EDFE82542AA}" type="datetime1">
               <a:rPr lang="de-DE" smtClean="0"/>
-              <a:t>09.01.2024</a:t>
+              <a:t>10.01.2024</a:t>
             </a:fld>
             <a:endParaRPr lang="de-DE"/>
           </a:p>
@@ -425,7 +425,7 @@
             <a:fld id="{0D6A315A-AEB2-48A1-84FA-B4A8FE58B7D2}" type="datetime1">
               <a:rPr lang="de-DE" smtClean="0"/>
               <a:pPr/>
-              <a:t>09.01.2024</a:t>
+              <a:t>10.01.2024</a:t>
             </a:fld>
             <a:endParaRPr lang="de-DE" dirty="0"/>
           </a:p>
@@ -1911,7 +1911,7 @@
             <a:pPr rtl="0"/>
             <a:fld id="{A8748828-F6EB-4704-9353-51DD373A1B63}" type="datetime1">
               <a:rPr lang="de-DE" noProof="0" smtClean="0"/>
-              <a:t>09.01.2024</a:t>
+              <a:t>10.01.2024</a:t>
             </a:fld>
             <a:endParaRPr lang="de-DE" noProof="0"/>
           </a:p>
@@ -2537,7 +2537,7 @@
             <a:pPr rtl="0"/>
             <a:fld id="{3BAA270F-9618-4C37-A567-2E8C03DB9594}" type="datetime1">
               <a:rPr lang="de-DE" noProof="0" smtClean="0"/>
-              <a:t>09.01.2024</a:t>
+              <a:t>10.01.2024</a:t>
             </a:fld>
             <a:endParaRPr lang="de-DE" noProof="0" dirty="0"/>
           </a:p>
@@ -3516,7 +3516,7 @@
               <a:defRPr/>
             </a:pPr>
             <a:r>
-              <a:rPr lang="de-DE" sz="1100" dirty="0">
+              <a:rPr lang="de-DE" sz="1050" dirty="0">
                 <a:solidFill>
                   <a:prstClr val="black">
                     <a:lumMod val="75000"/>
@@ -3856,7 +3856,7 @@
               <a:defRPr/>
             </a:pPr>
             <a:r>
-              <a:rPr lang="de-DE" sz="1100" dirty="0">
+              <a:rPr lang="de-DE" sz="1050" dirty="0">
                 <a:solidFill>
                   <a:prstClr val="black">
                     <a:lumMod val="75000"/>
@@ -3988,7 +3988,7 @@
         </p:spPr>
         <p:txBody>
           <a:bodyPr vert="horz" lIns="91440" tIns="45720" rIns="91440" bIns="45720" rtlCol="0">
-            <a:normAutofit lnSpcReduction="10000"/>
+            <a:normAutofit fontScale="92500" lnSpcReduction="10000"/>
           </a:bodyPr>
           <a:lstStyle>
             <a:lvl1pPr marL="228600" indent="-228600" algn="l" defTabSz="914400" rtl="0" eaLnBrk="1" latinLnBrk="0" hangingPunct="1">
@@ -4187,7 +4187,7 @@
           <a:p>
             <a:pPr marL="0" lvl="0" indent="0" rtl="0">
               <a:lnSpc>
-                <a:spcPct val="100000"/>
+                <a:spcPct val="110000"/>
               </a:lnSpc>
               <a:spcAft>
                 <a:spcPts val="600"/>
@@ -4211,7 +4211,7 @@
           <a:p>
             <a:pPr lvl="1">
               <a:lnSpc>
-                <a:spcPct val="100000"/>
+                <a:spcPct val="110000"/>
               </a:lnSpc>
               <a:spcAft>
                 <a:spcPts val="600"/>
@@ -4235,7 +4235,7 @@
           <a:p>
             <a:pPr lvl="1">
               <a:lnSpc>
-                <a:spcPct val="100000"/>
+                <a:spcPct val="110000"/>
               </a:lnSpc>
               <a:spcAft>
                 <a:spcPts val="600"/>
@@ -4271,7 +4271,7 @@
           <a:p>
             <a:pPr lvl="1">
               <a:lnSpc>
-                <a:spcPct val="100000"/>
+                <a:spcPct val="110000"/>
               </a:lnSpc>
               <a:spcAft>
                 <a:spcPts val="600"/>
@@ -4391,7 +4391,7 @@
           <a:p>
             <a:pPr marL="457200" lvl="1" indent="0">
               <a:lnSpc>
-                <a:spcPct val="100000"/>
+                <a:spcPct val="110000"/>
               </a:lnSpc>
               <a:spcAft>
                 <a:spcPts val="600"/>
@@ -4523,7 +4523,7 @@
         </p:nvSpPr>
         <p:spPr>
           <a:xfrm>
-            <a:off x="1046169" y="4210287"/>
+            <a:off x="1046169" y="4251136"/>
             <a:ext cx="5303098" cy="2363638"/>
           </a:xfrm>
           <a:prstGeom prst="rect">
@@ -4740,7 +4740,7 @@
               <a:defRPr/>
             </a:pPr>
             <a:r>
-              <a:rPr lang="de-DE" sz="1100" dirty="0">
+              <a:rPr lang="de-DE" sz="1000" dirty="0">
                 <a:solidFill>
                   <a:prstClr val="black">
                     <a:lumMod val="75000"/>
@@ -4764,7 +4764,7 @@
               <a:defRPr/>
             </a:pPr>
             <a:r>
-              <a:rPr lang="de-DE" sz="1100" dirty="0">
+              <a:rPr lang="de-DE" sz="1000" dirty="0">
                 <a:solidFill>
                   <a:prstClr val="black">
                     <a:lumMod val="75000"/>
@@ -4788,7 +4788,7 @@
               <a:defRPr/>
             </a:pPr>
             <a:r>
-              <a:rPr lang="de-DE" sz="1100" dirty="0">
+              <a:rPr lang="de-DE" sz="1000" dirty="0">
                 <a:solidFill>
                   <a:prstClr val="black">
                     <a:lumMod val="75000"/>
@@ -4812,7 +4812,7 @@
               <a:defRPr/>
             </a:pPr>
             <a:r>
-              <a:rPr lang="de-DE" sz="1100" dirty="0">
+              <a:rPr lang="de-DE" sz="1000" dirty="0">
                 <a:solidFill>
                   <a:prstClr val="black">
                     <a:lumMod val="75000"/>
@@ -4824,7 +4824,7 @@
               <a:t>(M)</a:t>
             </a:r>
             <a:r>
-              <a:rPr lang="de-DE" sz="1100" dirty="0" err="1">
+              <a:rPr lang="de-DE" sz="1000" dirty="0" err="1">
                 <a:solidFill>
                   <a:prstClr val="black">
                     <a:lumMod val="75000"/>
@@ -4836,7 +4836,7 @@
               <a:t>ean</a:t>
             </a:r>
             <a:r>
-              <a:rPr lang="de-DE" sz="1100" dirty="0">
+              <a:rPr lang="de-DE" sz="1000" dirty="0">
                 <a:solidFill>
                   <a:prstClr val="black">
                     <a:lumMod val="75000"/>
@@ -4848,7 +4848,7 @@
               <a:t> (A)</a:t>
             </a:r>
             <a:r>
-              <a:rPr lang="de-DE" sz="1100" dirty="0" err="1">
+              <a:rPr lang="de-DE" sz="1000" dirty="0" err="1">
                 <a:solidFill>
                   <a:prstClr val="black">
                     <a:lumMod val="75000"/>
@@ -4860,7 +4860,7 @@
               <a:t>bsolute</a:t>
             </a:r>
             <a:r>
-              <a:rPr lang="de-DE" sz="1100" dirty="0">
+              <a:rPr lang="de-DE" sz="1000" dirty="0">
                 <a:solidFill>
                   <a:prstClr val="black">
                     <a:lumMod val="75000"/>
@@ -4872,7 +4872,7 @@
               <a:t> (P)</a:t>
             </a:r>
             <a:r>
-              <a:rPr lang="de-DE" sz="1100" dirty="0" err="1">
+              <a:rPr lang="de-DE" sz="1000" dirty="0" err="1">
                 <a:solidFill>
                   <a:prstClr val="black">
                     <a:lumMod val="75000"/>
@@ -4884,7 +4884,7 @@
               <a:t>ercentage</a:t>
             </a:r>
             <a:r>
-              <a:rPr lang="de-DE" sz="1100" dirty="0">
+              <a:rPr lang="de-DE" sz="1000" dirty="0">
                 <a:solidFill>
                   <a:prstClr val="black">
                     <a:lumMod val="75000"/>
@@ -4896,7 +4896,7 @@
               <a:t> (E)</a:t>
             </a:r>
             <a:r>
-              <a:rPr lang="de-DE" sz="1100" dirty="0" err="1">
+              <a:rPr lang="de-DE" sz="1000" dirty="0" err="1">
                 <a:solidFill>
                   <a:prstClr val="black">
                     <a:lumMod val="75000"/>
@@ -4908,7 +4908,7 @@
               <a:t>rror</a:t>
             </a:r>
             <a:r>
-              <a:rPr lang="de-DE" sz="1100" dirty="0">
+              <a:rPr lang="de-DE" sz="1000" dirty="0">
                 <a:solidFill>
                   <a:prstClr val="black">
                     <a:lumMod val="75000"/>
@@ -4932,7 +4932,7 @@
               <a:defRPr/>
             </a:pPr>
             <a:r>
-              <a:rPr lang="de-DE" sz="1100" dirty="0">
+              <a:rPr lang="de-DE" sz="1000" dirty="0">
                 <a:solidFill>
                   <a:prstClr val="black">
                     <a:lumMod val="75000"/>
@@ -4943,7 +4943,7 @@
               </a:rPr>
               <a:t>09.06.2019 - 30.07.2019</a:t>
             </a:r>
-            <a:endParaRPr lang="de-DE" sz="1100" dirty="0">
+            <a:endParaRPr lang="de-DE" sz="1000" dirty="0">
               <a:solidFill>
                 <a:prstClr val="black">
                   <a:lumMod val="75000"/>
@@ -5372,7 +5372,7 @@
                 </a:solidFill>
                 <a:cs typeface="Segoe UI"/>
               </a:rPr>
-              <a:t>Umsatzdaten nach Warengruppen sortiert (Kategorie)</a:t>
+              <a:t>Umsatzdaten nach Warengruppen sortiert (Gruppierte Kategorie)</a:t>
             </a:r>
           </a:p>
         </p:txBody>
@@ -6148,53 +6148,8 @@
                 </a:solidFill>
                 <a:cs typeface="Segoe UI" panose="020B0502040204020203" pitchFamily="34" charset="0"/>
               </a:rPr>
-              <a:t>Temperatur (</a:t>
-            </a:r>
-            <a:r>
-              <a:rPr lang="en-US" sz="1100" dirty="0">
-                <a:solidFill>
-                  <a:prstClr val="black">
-                    <a:lumMod val="75000"/>
-                    <a:lumOff val="25000"/>
-                  </a:prstClr>
-                </a:solidFill>
-                <a:cs typeface="Segoe UI" panose="020B0502040204020203" pitchFamily="34" charset="0"/>
-              </a:rPr>
-              <a:t>is not linear, needs to be used as a binned category,-8.475 to 31.438 degrees) (</a:t>
-            </a:r>
-            <a:r>
-              <a:rPr lang="en-US" sz="1100" dirty="0" err="1">
-                <a:solidFill>
-                  <a:prstClr val="black">
-                    <a:lumMod val="75000"/>
-                    <a:lumOff val="25000"/>
-                  </a:prstClr>
-                </a:solidFill>
-                <a:cs typeface="Segoe UI" panose="020B0502040204020203" pitchFamily="34" charset="0"/>
-              </a:rPr>
-              <a:t>Manuell</a:t>
-            </a:r>
-            <a:r>
-              <a:rPr lang="en-US" sz="1100" dirty="0">
-                <a:solidFill>
-                  <a:prstClr val="black">
-                    <a:lumMod val="75000"/>
-                    <a:lumOff val="25000"/>
-                  </a:prstClr>
-                </a:solidFill>
-                <a:cs typeface="Segoe UI" panose="020B0502040204020203" pitchFamily="34" charset="0"/>
-              </a:rPr>
-              <a:t>:(-10, 0, 5, 10, 15, 20, 25, 35))</a:t>
-            </a:r>
-            <a:endParaRPr lang="de-DE" sz="1100" dirty="0">
-              <a:solidFill>
-                <a:prstClr val="black">
-                  <a:lumMod val="75000"/>
-                  <a:lumOff val="25000"/>
-                </a:prstClr>
-              </a:solidFill>
-              <a:cs typeface="Segoe UI" panose="020B0502040204020203" pitchFamily="34" charset="0"/>
-            </a:endParaRPr>
+              <a:t>Temperatur (linear, gruppierte Kategorie)</a:t>
+            </a:r>
           </a:p>
           <a:p>
             <a:pPr lvl="0" rtl="0">
@@ -6217,29 +6172,8 @@
                 </a:solidFill>
                 <a:cs typeface="Segoe UI" panose="020B0502040204020203" pitchFamily="34" charset="0"/>
               </a:rPr>
-              <a:t>Windgeschwindigkeit (</a:t>
-            </a:r>
-            <a:r>
-              <a:rPr lang="en-US" sz="1100" dirty="0">
-                <a:solidFill>
-                  <a:prstClr val="black">
-                    <a:lumMod val="75000"/>
-                    <a:lumOff val="25000"/>
-                  </a:prstClr>
-                </a:solidFill>
-                <a:cs typeface="Segoe UI" panose="020B0502040204020203" pitchFamily="34" charset="0"/>
-              </a:rPr>
-              <a:t>is linear, use as it is)</a:t>
-            </a:r>
-            <a:endParaRPr lang="de-DE" sz="1100" dirty="0">
-              <a:solidFill>
-                <a:prstClr val="black">
-                  <a:lumMod val="75000"/>
-                  <a:lumOff val="25000"/>
-                </a:prstClr>
-              </a:solidFill>
-              <a:cs typeface="Segoe UI" panose="020B0502040204020203" pitchFamily="34" charset="0"/>
-            </a:endParaRPr>
+              <a:t>Bewölkung</a:t>
+            </a:r>
           </a:p>
           <a:p>
             <a:pPr lvl="0" rtl="0">
@@ -6262,29 +6196,8 @@
                 </a:solidFill>
                 <a:cs typeface="Segoe UI" panose="020B0502040204020203" pitchFamily="34" charset="0"/>
               </a:rPr>
-              <a:t>Wettercode (</a:t>
-            </a:r>
-            <a:r>
-              <a:rPr lang="en-US" sz="1100" dirty="0">
-                <a:solidFill>
-                  <a:prstClr val="black">
-                    <a:lumMod val="75000"/>
-                    <a:lumOff val="25000"/>
-                  </a:prstClr>
-                </a:solidFill>
-                <a:cs typeface="Segoe UI" panose="020B0502040204020203" pitchFamily="34" charset="0"/>
-              </a:rPr>
-              <a:t>too many missing values and therefore currently not useful)</a:t>
-            </a:r>
-            <a:endParaRPr lang="de-DE" sz="1100" dirty="0">
-              <a:solidFill>
-                <a:prstClr val="black">
-                  <a:lumMod val="75000"/>
-                  <a:lumOff val="25000"/>
-                </a:prstClr>
-              </a:solidFill>
-              <a:cs typeface="Segoe UI" panose="020B0502040204020203" pitchFamily="34" charset="0"/>
-            </a:endParaRPr>
+              <a:t>Wettercode</a:t>
+            </a:r>
           </a:p>
         </p:txBody>
       </p:sp>
@@ -6793,14 +6706,14 @@
           <p:nvPr>
             <p:extLst>
               <p:ext uri="{D42A27DB-BD31-4B8C-83A1-F6EECF244321}">
-                <p14:modId xmlns:p14="http://schemas.microsoft.com/office/powerpoint/2010/main" val="4069399743"/>
+                <p14:modId xmlns:p14="http://schemas.microsoft.com/office/powerpoint/2010/main" val="2252088184"/>
               </p:ext>
             </p:extLst>
           </p:nvPr>
         </p:nvGraphicFramePr>
         <p:xfrm>
           <a:off x="613713" y="2087896"/>
-          <a:ext cx="10876671" cy="2929640"/>
+          <a:ext cx="10876671" cy="3482085"/>
         </p:xfrm>
         <a:graphic>
           <a:graphicData uri="http://schemas.openxmlformats.org/drawingml/2006/table">
@@ -6880,6 +6793,20 @@
                         </a:rPr>
                         <a:t> R²</a:t>
                       </a:r>
+                    </a:p>
+                    <a:p>
+                      <a:r>
+                        <a:rPr lang="de-DE" sz="1200" dirty="0">
+                          <a:solidFill>
+                            <a:prstClr val="black">
+                              <a:lumMod val="75000"/>
+                              <a:lumOff val="25000"/>
+                            </a:prstClr>
+                          </a:solidFill>
+                          <a:cs typeface="Segoe UI"/>
+                        </a:rPr>
+                        <a:t>(Güte Regression)</a:t>
+                      </a:r>
                       <a:endParaRPr lang="de-DE" sz="1200" dirty="0"/>
                     </a:p>
                   </a:txBody>
@@ -6949,7 +6876,7 @@
                     <a:p>
                       <a:r>
                         <a:rPr lang="de-DE" sz="1200" dirty="0"/>
-                        <a:t>0.6876 </a:t>
+                        <a:t>0.6876</a:t>
                       </a:r>
                     </a:p>
                   </a:txBody>
@@ -7207,7 +7134,7 @@
                       </a:pPr>
                       <a:r>
                         <a:rPr lang="de-DE" sz="1200" dirty="0"/>
-                        <a:t>0.7129 </a:t>
+                        <a:t>0.7129</a:t>
                       </a:r>
                     </a:p>
                     <a:p>
@@ -7336,6 +7263,63 @@
                   </a:ext>
                 </a:extLst>
               </a:tr>
+              <a:tr h="369565">
+                <a:tc>
+                  <a:txBody>
+                    <a:bodyPr/>
+                    <a:lstStyle/>
+                    <a:p>
+                      <a:r>
+                        <a:rPr lang="de-DE" sz="1200" dirty="0"/>
+                        <a:t>mod8 &lt;- lm(Umsatz ~ </a:t>
+                      </a:r>
+                      <a:r>
+                        <a:rPr lang="de-DE" sz="1200" dirty="0" err="1"/>
+                        <a:t>as.factor</a:t>
+                      </a:r>
+                      <a:r>
+                        <a:rPr lang="de-DE" sz="1200" dirty="0"/>
+                        <a:t>(Warengruppe) + </a:t>
+                      </a:r>
+                      <a:r>
+                        <a:rPr lang="de-DE" sz="1200" dirty="0" err="1"/>
+                        <a:t>Temperatur_bins</a:t>
+                      </a:r>
+                      <a:r>
+                        <a:rPr lang="de-DE" sz="1200" dirty="0"/>
+                        <a:t> + Wochenende + </a:t>
+                      </a:r>
+                      <a:r>
+                        <a:rPr lang="de-DE" sz="1200" dirty="0" err="1"/>
+                        <a:t>KielerWoche</a:t>
+                      </a:r>
+                      <a:r>
+                        <a:rPr lang="de-DE" sz="1200" dirty="0"/>
+                        <a:t> + Schulferien, training_data3)</a:t>
+                      </a:r>
+                    </a:p>
+                  </a:txBody>
+                  <a:tcPr/>
+                </a:tc>
+                <a:tc>
+                  <a:txBody>
+                    <a:bodyPr/>
+                    <a:lstStyle/>
+                    <a:p>
+                      <a:r>
+                        <a:rPr lang="de-DE" sz="1200" dirty="0"/>
+                        <a:t>0.7274</a:t>
+                      </a:r>
+                    </a:p>
+                  </a:txBody>
+                  <a:tcPr/>
+                </a:tc>
+                <a:extLst>
+                  <a:ext uri="{0D108BD9-81ED-4DB2-BD59-A6C34878D82A}">
+                    <a16:rowId xmlns:a16="http://schemas.microsoft.com/office/drawing/2014/main" val="447189459"/>
+                  </a:ext>
+                </a:extLst>
+              </a:tr>
             </a:tbl>
           </a:graphicData>
         </a:graphic>
@@ -7582,6 +7566,119 @@
           </a:p>
         </p:txBody>
       </p:sp>
+      <p:sp>
+        <p:nvSpPr>
+          <p:cNvPr id="2" name="Textfeld 1">
+            <a:extLst>
+              <a:ext uri="{FF2B5EF4-FFF2-40B4-BE49-F238E27FC236}">
+                <a16:creationId xmlns:a16="http://schemas.microsoft.com/office/drawing/2014/main" id="{15FA6A0B-DD36-9EA6-0061-734E8B7CF91A}"/>
+              </a:ext>
+            </a:extLst>
+          </p:cNvPr>
+          <p:cNvSpPr txBox="1"/>
+          <p:nvPr/>
+        </p:nvSpPr>
+        <p:spPr>
+          <a:xfrm>
+            <a:off x="521207" y="2649809"/>
+            <a:ext cx="8893781" cy="276999"/>
+          </a:xfrm>
+          <a:prstGeom prst="rect">
+            <a:avLst/>
+          </a:prstGeom>
+          <a:noFill/>
+        </p:spPr>
+        <p:txBody>
+          <a:bodyPr wrap="none" rtlCol="0">
+            <a:spAutoFit/>
+          </a:bodyPr>
+          <a:lstStyle/>
+          <a:p>
+            <a:r>
+              <a:rPr lang="de-DE" sz="1200" b="0" i="0" dirty="0">
+                <a:effectLst/>
+              </a:rPr>
+              <a:t>Differenz zwischen prognostizierten Werten und wahren Werten, geteilt durch den wahren Wert. Nicht effizient bei Extremwerten.</a:t>
+            </a:r>
+            <a:endParaRPr lang="de-DE" sz="1200" dirty="0"/>
+          </a:p>
+        </p:txBody>
+      </p:sp>
+      <p:sp>
+        <p:nvSpPr>
+          <p:cNvPr id="3" name="AutoShape 2">
+            <a:extLst>
+              <a:ext uri="{FF2B5EF4-FFF2-40B4-BE49-F238E27FC236}">
+                <a16:creationId xmlns:a16="http://schemas.microsoft.com/office/drawing/2014/main" id="{FCFDB311-2C6A-BE1C-DF6A-F9222FD21152}"/>
+              </a:ext>
+            </a:extLst>
+          </p:cNvPr>
+          <p:cNvSpPr>
+            <a:spLocks noChangeAspect="1" noChangeArrowheads="1"/>
+          </p:cNvSpPr>
+          <p:nvPr/>
+        </p:nvSpPr>
+        <p:spPr bwMode="auto">
+          <a:xfrm>
+            <a:off x="5943600" y="3276600"/>
+            <a:ext cx="304800" cy="304800"/>
+          </a:xfrm>
+          <a:prstGeom prst="rect">
+            <a:avLst/>
+          </a:prstGeom>
+          <a:noFill/>
+          <a:extLst>
+            <a:ext uri="{909E8E84-426E-40DD-AFC4-6F175D3DCCD1}">
+              <a14:hiddenFill xmlns:a14="http://schemas.microsoft.com/office/drawing/2010/main">
+                <a:solidFill>
+                  <a:srgbClr val="FFFFFF"/>
+                </a:solidFill>
+              </a14:hiddenFill>
+            </a:ext>
+          </a:extLst>
+        </p:spPr>
+        <p:txBody>
+          <a:bodyPr vert="horz" wrap="square" lIns="91440" tIns="45720" rIns="91440" bIns="45720" numCol="1" anchor="t" anchorCtr="0" compatLnSpc="1">
+            <a:prstTxWarp prst="textNoShape">
+              <a:avLst/>
+            </a:prstTxWarp>
+          </a:bodyPr>
+          <a:lstStyle/>
+          <a:p>
+            <a:endParaRPr lang="de-DE"/>
+          </a:p>
+        </p:txBody>
+      </p:sp>
+      <p:pic>
+        <p:nvPicPr>
+          <p:cNvPr id="8" name="Grafik 7">
+            <a:extLst>
+              <a:ext uri="{FF2B5EF4-FFF2-40B4-BE49-F238E27FC236}">
+                <a16:creationId xmlns:a16="http://schemas.microsoft.com/office/drawing/2014/main" id="{1C7911B3-95CE-D688-CF4C-21598444CADF}"/>
+              </a:ext>
+            </a:extLst>
+          </p:cNvPr>
+          <p:cNvPicPr>
+            <a:picLocks noChangeAspect="1"/>
+          </p:cNvPicPr>
+          <p:nvPr/>
+        </p:nvPicPr>
+        <p:blipFill>
+          <a:blip r:embed="rId3"/>
+          <a:stretch>
+            <a:fillRect/>
+          </a:stretch>
+        </p:blipFill>
+        <p:spPr>
+          <a:xfrm>
+            <a:off x="521207" y="1268491"/>
+            <a:ext cx="4229690" cy="1381318"/>
+          </a:xfrm>
+          <a:prstGeom prst="rect">
+            <a:avLst/>
+          </a:prstGeom>
+        </p:spPr>
+      </p:pic>
     </p:spTree>
     <p:extLst>
       <p:ext uri="{BB962C8B-B14F-4D97-AF65-F5344CB8AC3E}">

</xml_diff>